<commit_message>
pdates for api and json explanation
</commit_message>
<xml_diff>
--- a/ISS for python.pptx
+++ b/ISS for python.pptx
@@ -11,11 +11,12 @@
     <p:sldId id="263" r:id="rId5"/>
     <p:sldId id="260" r:id="rId6"/>
     <p:sldId id="261" r:id="rId7"/>
-    <p:sldId id="264" r:id="rId8"/>
-    <p:sldId id="265" r:id="rId9"/>
-    <p:sldId id="266" r:id="rId10"/>
-    <p:sldId id="259" r:id="rId11"/>
-    <p:sldId id="262" r:id="rId12"/>
+    <p:sldId id="267" r:id="rId8"/>
+    <p:sldId id="264" r:id="rId9"/>
+    <p:sldId id="265" r:id="rId10"/>
+    <p:sldId id="266" r:id="rId11"/>
+    <p:sldId id="259" r:id="rId12"/>
+    <p:sldId id="262" r:id="rId13"/>
   </p:sldIdLst>
   <p:sldSz cx="9144000" cy="6858000" type="screen4x3"/>
   <p:notesSz cx="6858000" cy="9144000"/>
@@ -133,8 +134,79 @@
 </p:presentation>
 </file>
 
+<file path=ppt/revisionInfo.xml><?xml version="1.0" encoding="utf-8"?>
+<p1510:revInfo xmlns:a="http://schemas.openxmlformats.org/drawingml/2006/main" xmlns:r="http://schemas.openxmlformats.org/officeDocument/2006/relationships" xmlns:p1510="http://schemas.microsoft.com/office/powerpoint/2015/10/main">
+  <p1510:revLst>
+    <p1510:client id="{E628F8FD-EA65-4E3C-A7F6-CA70B4DAC946}" v="75" dt="2018-09-05T11:00:51.598"/>
+  </p1510:revLst>
+</p1510:revInfo>
+</file>
+
 <file path=ppt/changesInfos/changesInfo1.xml><?xml version="1.0" encoding="utf-8"?>
 <pc:chgInfo xmlns:a="http://schemas.openxmlformats.org/drawingml/2006/main" xmlns:r="http://schemas.openxmlformats.org/officeDocument/2006/relationships" xmlns:ac="http://schemas.microsoft.com/office/drawing/2013/main/command" xmlns:pc="http://schemas.microsoft.com/office/powerpoint/2013/main/command">
+  <pc:docChgLst>
+    <pc:chgData name="Yury Petrov" userId="237b5763c722296b" providerId="LiveId" clId="{E628F8FD-EA65-4E3C-A7F6-CA70B4DAC946}"/>
+    <pc:docChg chg="custSel addSld modSld">
+      <pc:chgData name="Yury Petrov" userId="237b5763c722296b" providerId="LiveId" clId="{E628F8FD-EA65-4E3C-A7F6-CA70B4DAC946}" dt="2018-09-05T11:00:51.598" v="74" actId="20577"/>
+      <pc:docMkLst>
+        <pc:docMk/>
+      </pc:docMkLst>
+      <pc:sldChg chg="modSp">
+        <pc:chgData name="Yury Petrov" userId="237b5763c722296b" providerId="LiveId" clId="{E628F8FD-EA65-4E3C-A7F6-CA70B4DAC946}" dt="2018-09-05T11:00:51.598" v="74" actId="20577"/>
+        <pc:sldMkLst>
+          <pc:docMk/>
+          <pc:sldMk cId="3659674305" sldId="259"/>
+        </pc:sldMkLst>
+        <pc:spChg chg="mod">
+          <ac:chgData name="Yury Petrov" userId="237b5763c722296b" providerId="LiveId" clId="{E628F8FD-EA65-4E3C-A7F6-CA70B4DAC946}" dt="2018-09-05T11:00:51.598" v="74" actId="20577"/>
+          <ac:spMkLst>
+            <pc:docMk/>
+            <pc:sldMk cId="3659674305" sldId="259"/>
+            <ac:spMk id="11" creationId="{35F7BFCC-2D2C-4503-8733-9FC417B39772}"/>
+          </ac:spMkLst>
+        </pc:spChg>
+      </pc:sldChg>
+      <pc:sldChg chg="addSp delSp modSp add">
+        <pc:chgData name="Yury Petrov" userId="237b5763c722296b" providerId="LiveId" clId="{E628F8FD-EA65-4E3C-A7F6-CA70B4DAC946}" dt="2018-09-05T10:59:26.726" v="70"/>
+        <pc:sldMkLst>
+          <pc:docMk/>
+          <pc:sldMk cId="1809433584" sldId="267"/>
+        </pc:sldMkLst>
+        <pc:spChg chg="mod">
+          <ac:chgData name="Yury Petrov" userId="237b5763c722296b" providerId="LiveId" clId="{E628F8FD-EA65-4E3C-A7F6-CA70B4DAC946}" dt="2018-09-05T10:58:57.342" v="31" actId="20577"/>
+          <ac:spMkLst>
+            <pc:docMk/>
+            <pc:sldMk cId="1809433584" sldId="267"/>
+            <ac:spMk id="2" creationId="{3D8280B8-1074-4F1E-80B1-7715F2C042C3}"/>
+          </ac:spMkLst>
+        </pc:spChg>
+        <pc:spChg chg="mod">
+          <ac:chgData name="Yury Petrov" userId="237b5763c722296b" providerId="LiveId" clId="{E628F8FD-EA65-4E3C-A7F6-CA70B4DAC946}" dt="2018-09-05T10:59:13.078" v="69" actId="20577"/>
+          <ac:spMkLst>
+            <pc:docMk/>
+            <pc:sldMk cId="1809433584" sldId="267"/>
+            <ac:spMk id="3" creationId="{A8609F02-D492-43A5-ABAD-A67C4C6C64C7}"/>
+          </ac:spMkLst>
+        </pc:spChg>
+        <pc:spChg chg="del">
+          <ac:chgData name="Yury Petrov" userId="237b5763c722296b" providerId="LiveId" clId="{E628F8FD-EA65-4E3C-A7F6-CA70B4DAC946}" dt="2018-09-05T10:59:26.726" v="70"/>
+          <ac:spMkLst>
+            <pc:docMk/>
+            <pc:sldMk cId="1809433584" sldId="267"/>
+            <ac:spMk id="4" creationId="{37A8D5C6-29FA-40CB-ACCA-1DC0D610B40B}"/>
+          </ac:spMkLst>
+        </pc:spChg>
+        <pc:picChg chg="add mod">
+          <ac:chgData name="Yury Petrov" userId="237b5763c722296b" providerId="LiveId" clId="{E628F8FD-EA65-4E3C-A7F6-CA70B4DAC946}" dt="2018-09-05T10:59:26.726" v="70"/>
+          <ac:picMkLst>
+            <pc:docMk/>
+            <pc:sldMk cId="1809433584" sldId="267"/>
+            <ac:picMk id="6" creationId="{0FC96A01-7E6C-458D-A4E3-60D25B34409E}"/>
+          </ac:picMkLst>
+        </pc:picChg>
+      </pc:sldChg>
+    </pc:docChg>
+  </pc:docChgLst>
   <pc:docChgLst>
     <pc:chgData name="Guest User" providerId="Windows Live" clId="Web-{C8AC16D4-EF79-4E79-BA11-00ADAE3C60C7}"/>
     <pc:docChg chg="modSld">
@@ -255,7 +327,7 @@
           <a:p>
             <a:fld id="{18DCCD61-643D-44A5-A450-3A42A50CBC1E}" type="datetimeFigureOut">
               <a:rPr lang="en-US" smtClean="0"/>
-              <a:t>8/23/2018</a:t>
+              <a:t>9/5/2018</a:t>
             </a:fld>
             <a:endParaRPr lang="en-US"/>
           </a:p>
@@ -530,7 +602,7 @@
           <a:p>
             <a:fld id="{18DCCD61-643D-44A5-A450-3A42A50CBC1E}" type="datetimeFigureOut">
               <a:rPr lang="en-US" smtClean="0"/>
-              <a:t>8/23/2018</a:t>
+              <a:t>9/5/2018</a:t>
             </a:fld>
             <a:endParaRPr lang="en-US"/>
           </a:p>
@@ -782,7 +854,7 @@
           <a:p>
             <a:fld id="{18DCCD61-643D-44A5-A450-3A42A50CBC1E}" type="datetimeFigureOut">
               <a:rPr lang="en-US" smtClean="0"/>
-              <a:t>8/23/2018</a:t>
+              <a:t>9/5/2018</a:t>
             </a:fld>
             <a:endParaRPr lang="en-US"/>
           </a:p>
@@ -950,7 +1022,7 @@
           <a:p>
             <a:fld id="{18DCCD61-643D-44A5-A450-3A42A50CBC1E}" type="datetimeFigureOut">
               <a:rPr lang="en-US" smtClean="0"/>
-              <a:t>8/23/2018</a:t>
+              <a:t>9/5/2018</a:t>
             </a:fld>
             <a:endParaRPr lang="en-US"/>
           </a:p>
@@ -1128,7 +1200,7 @@
           <a:p>
             <a:fld id="{18DCCD61-643D-44A5-A450-3A42A50CBC1E}" type="datetimeFigureOut">
               <a:rPr lang="en-US" smtClean="0"/>
-              <a:t>8/23/2018</a:t>
+              <a:t>9/5/2018</a:t>
             </a:fld>
             <a:endParaRPr lang="en-US"/>
           </a:p>
@@ -1722,7 +1794,7 @@
           <a:p>
             <a:fld id="{18DCCD61-643D-44A5-A450-3A42A50CBC1E}" type="datetimeFigureOut">
               <a:rPr lang="en-US" smtClean="0"/>
-              <a:t>8/23/2018</a:t>
+              <a:t>9/5/2018</a:t>
             </a:fld>
             <a:endParaRPr lang="en-US"/>
           </a:p>
@@ -1890,7 +1962,7 @@
           <a:p>
             <a:fld id="{18DCCD61-643D-44A5-A450-3A42A50CBC1E}" type="datetimeFigureOut">
               <a:rPr lang="en-US" smtClean="0"/>
-              <a:t>8/23/2018</a:t>
+              <a:t>9/5/2018</a:t>
             </a:fld>
             <a:endParaRPr lang="en-US"/>
           </a:p>
@@ -2135,7 +2207,7 @@
           <a:p>
             <a:fld id="{18DCCD61-643D-44A5-A450-3A42A50CBC1E}" type="datetimeFigureOut">
               <a:rPr lang="en-US" smtClean="0"/>
-              <a:t>8/23/2018</a:t>
+              <a:t>9/5/2018</a:t>
             </a:fld>
             <a:endParaRPr lang="en-US"/>
           </a:p>
@@ -2420,7 +2492,7 @@
           <a:p>
             <a:fld id="{18DCCD61-643D-44A5-A450-3A42A50CBC1E}" type="datetimeFigureOut">
               <a:rPr lang="en-US" smtClean="0"/>
-              <a:t>8/23/2018</a:t>
+              <a:t>9/5/2018</a:t>
             </a:fld>
             <a:endParaRPr lang="en-US"/>
           </a:p>
@@ -2839,7 +2911,7 @@
           <a:p>
             <a:fld id="{18DCCD61-643D-44A5-A450-3A42A50CBC1E}" type="datetimeFigureOut">
               <a:rPr lang="en-US" smtClean="0"/>
-              <a:t>8/23/2018</a:t>
+              <a:t>9/5/2018</a:t>
             </a:fld>
             <a:endParaRPr lang="en-US"/>
           </a:p>
@@ -2956,7 +3028,7 @@
           <a:p>
             <a:fld id="{18DCCD61-643D-44A5-A450-3A42A50CBC1E}" type="datetimeFigureOut">
               <a:rPr lang="en-US" smtClean="0"/>
-              <a:t>8/23/2018</a:t>
+              <a:t>9/5/2018</a:t>
             </a:fld>
             <a:endParaRPr lang="en-US"/>
           </a:p>
@@ -3458,7 +3530,7 @@
           <a:p>
             <a:fld id="{18DCCD61-643D-44A5-A450-3A42A50CBC1E}" type="datetimeFigureOut">
               <a:rPr lang="en-US" smtClean="0"/>
-              <a:t>8/23/2018</a:t>
+              <a:t>9/5/2018</a:t>
             </a:fld>
             <a:endParaRPr lang="en-US"/>
           </a:p>
@@ -3906,13 +3978,6 @@
   <p:clrMapOvr>
     <a:masterClrMapping/>
   </p:clrMapOvr>
-  <p:timing>
-    <p:tnLst>
-      <p:par>
-        <p:cTn id="1" dur="indefinite" restart="never" nodeType="tmRoot"/>
-      </p:par>
-    </p:tnLst>
-  </p:timing>
 </p:sld>
 </file>
 
@@ -3950,6 +4015,148 @@
           <a:p>
             <a:r>
               <a:rPr lang="en-AU" altLang="ko-KR" sz="3600" dirty="0"/>
+              <a:t>How to start</a:t>
+            </a:r>
+            <a:endParaRPr lang="ko-KR" altLang="en-US" sz="3600" dirty="0"/>
+          </a:p>
+        </p:txBody>
+      </p:sp>
+      <p:sp>
+        <p:nvSpPr>
+          <p:cNvPr id="12" name="Content Placeholder 11"/>
+          <p:cNvSpPr>
+            <a:spLocks noGrp="1"/>
+          </p:cNvSpPr>
+          <p:nvPr>
+            <p:ph idx="1"/>
+          </p:nvPr>
+        </p:nvSpPr>
+        <p:spPr/>
+        <p:txBody>
+          <a:bodyPr/>
+          <a:lstStyle/>
+          <a:p>
+            <a:pPr lvl="0"/>
+            <a:r>
+              <a:rPr lang="en-US" altLang="ko-KR" sz="3600" b="1" dirty="0"/>
+              <a:t>Information</a:t>
+            </a:r>
+            <a:endParaRPr lang="en-US" altLang="ko-KR" sz="3600" b="1" dirty="0">
+              <a:latin typeface="Arial" pitchFamily="34" charset="0"/>
+              <a:cs typeface="Arial" pitchFamily="34" charset="0"/>
+            </a:endParaRPr>
+          </a:p>
+        </p:txBody>
+      </p:sp>
+      <p:sp>
+        <p:nvSpPr>
+          <p:cNvPr id="11" name="Content Placeholder 12">
+            <a:extLst>
+              <a:ext uri="{FF2B5EF4-FFF2-40B4-BE49-F238E27FC236}">
+                <a16:creationId xmlns:a16="http://schemas.microsoft.com/office/drawing/2014/main" id="{35F7BFCC-2D2C-4503-8733-9FC417B39772}"/>
+              </a:ext>
+            </a:extLst>
+          </p:cNvPr>
+          <p:cNvSpPr>
+            <a:spLocks noGrp="1"/>
+          </p:cNvSpPr>
+          <p:nvPr>
+            <p:ph idx="10"/>
+          </p:nvPr>
+        </p:nvSpPr>
+        <p:spPr>
+          <a:xfrm>
+            <a:off x="1763688" y="1844824"/>
+            <a:ext cx="6563072" cy="1584176"/>
+          </a:xfrm>
+        </p:spPr>
+        <p:txBody>
+          <a:bodyPr/>
+          <a:lstStyle/>
+          <a:p>
+            <a:pPr marL="285750" indent="-285750">
+              <a:buFont typeface="Arial" panose="020B0604020202020204" pitchFamily="34" charset="0"/>
+              <a:buChar char="•"/>
+            </a:pPr>
+            <a:r>
+              <a:rPr lang="en-AU" altLang="ko-KR" sz="3200" dirty="0">
+                <a:latin typeface="Arial" pitchFamily="34" charset="0"/>
+                <a:cs typeface="Arial" pitchFamily="34" charset="0"/>
+              </a:rPr>
+              <a:t>Readme: https://github.com/Yury-Petrov/Mgc-Iss-workshop</a:t>
+            </a:r>
+          </a:p>
+          <a:p>
+            <a:pPr marL="285750" indent="-285750">
+              <a:buFont typeface="Arial" panose="020B0604020202020204" pitchFamily="34" charset="0"/>
+              <a:buChar char="•"/>
+            </a:pPr>
+            <a:r>
+              <a:rPr lang="en-AU" altLang="ko-KR" sz="3200" dirty="0">
+                <a:latin typeface="Arial" pitchFamily="34" charset="0"/>
+                <a:cs typeface="Arial" pitchFamily="34" charset="0"/>
+              </a:rPr>
+              <a:t>API: http://api.open-notify.org</a:t>
+            </a:r>
+          </a:p>
+          <a:p>
+            <a:r>
+              <a:rPr lang="en-AU" altLang="ko-KR" sz="3200" dirty="0">
+                <a:latin typeface="Arial" pitchFamily="34" charset="0"/>
+                <a:cs typeface="Arial" pitchFamily="34" charset="0"/>
+              </a:rPr>
+              <a:t>Now let’s do it!</a:t>
+            </a:r>
+          </a:p>
+        </p:txBody>
+      </p:sp>
+    </p:spTree>
+    <p:extLst>
+      <p:ext uri="{BB962C8B-B14F-4D97-AF65-F5344CB8AC3E}">
+        <p14:creationId xmlns:p14="http://schemas.microsoft.com/office/powerpoint/2010/main" val="3659674305"/>
+      </p:ext>
+    </p:extLst>
+  </p:cSld>
+  <p:clrMapOvr>
+    <a:masterClrMapping/>
+  </p:clrMapOvr>
+</p:sld>
+</file>
+
+<file path=ppt/slides/slide11.xml><?xml version="1.0" encoding="utf-8"?>
+<p:sld xmlns:a="http://schemas.openxmlformats.org/drawingml/2006/main" xmlns:r="http://schemas.openxmlformats.org/officeDocument/2006/relationships" xmlns:p="http://schemas.openxmlformats.org/presentationml/2006/main">
+  <p:cSld>
+    <p:spTree>
+      <p:nvGrpSpPr>
+        <p:cNvPr id="1" name=""/>
+        <p:cNvGrpSpPr/>
+        <p:nvPr/>
+      </p:nvGrpSpPr>
+      <p:grpSpPr>
+        <a:xfrm>
+          <a:off x="0" y="0"/>
+          <a:ext cx="0" cy="0"/>
+          <a:chOff x="0" y="0"/>
+          <a:chExt cx="0" cy="0"/>
+        </a:xfrm>
+      </p:grpSpPr>
+      <p:sp>
+        <p:nvSpPr>
+          <p:cNvPr id="4" name="Title 3"/>
+          <p:cNvSpPr>
+            <a:spLocks noGrp="1"/>
+          </p:cNvSpPr>
+          <p:nvPr>
+            <p:ph type="title"/>
+          </p:nvPr>
+        </p:nvSpPr>
+        <p:spPr/>
+        <p:txBody>
+          <a:bodyPr/>
+          <a:lstStyle/>
+          <a:p>
+            <a:r>
+              <a:rPr lang="en-AU" altLang="ko-KR" sz="3600" dirty="0"/>
               <a:t>Credits and links</a:t>
             </a:r>
             <a:endParaRPr lang="ko-KR" altLang="en-US" sz="3600" dirty="0"/>
@@ -4180,13 +4387,6 @@
   <p:clrMapOvr>
     <a:masterClrMapping/>
   </p:clrMapOvr>
-  <p:timing>
-    <p:tnLst>
-      <p:par>
-        <p:cTn id="1" dur="indefinite" restart="never" nodeType="tmRoot"/>
-      </p:par>
-    </p:tnLst>
-  </p:timing>
 </p:sld>
 </file>
 
@@ -4307,11 +4507,7 @@
             </a:r>
             <a:r>
               <a:rPr lang="en-AU" altLang="ko-KR"/>
-              <a:t>in </a:t>
-            </a:r>
-            <a:r>
-              <a:rPr lang="en-AU" altLang="ko-KR" smtClean="0"/>
-              <a:t>1998</a:t>
+              <a:t>in 1998</a:t>
             </a:r>
             <a:endParaRPr lang="en-AU" altLang="ko-KR" dirty="0"/>
           </a:p>
@@ -4738,13 +4934,6 @@
   <p:clrMapOvr>
     <a:masterClrMapping/>
   </p:clrMapOvr>
-  <p:timing>
-    <p:tnLst>
-      <p:par>
-        <p:cTn id="1" dur="indefinite" restart="never" nodeType="tmRoot"/>
-      </p:par>
-    </p:tnLst>
-  </p:timing>
 </p:sld>
 </file>
 
@@ -4832,13 +5021,6 @@
   <p:clrMapOvr>
     <a:masterClrMapping/>
   </p:clrMapOvr>
-  <p:timing>
-    <p:tnLst>
-      <p:par>
-        <p:cTn id="1" dur="indefinite" restart="never" nodeType="tmRoot"/>
-      </p:par>
-    </p:tnLst>
-  </p:timing>
 </p:sld>
 </file>
 
@@ -5380,13 +5562,6 @@
   <p:clrMapOvr>
     <a:masterClrMapping/>
   </p:clrMapOvr>
-  <p:timing>
-    <p:tnLst>
-      <p:par>
-        <p:cTn id="1" dur="indefinite" restart="never" nodeType="tmRoot"/>
-      </p:par>
-    </p:tnLst>
-  </p:timing>
 </p:sld>
 </file>
 
@@ -5607,13 +5782,6 @@
   <p:clrMapOvr>
     <a:masterClrMapping/>
   </p:clrMapOvr>
-  <p:timing>
-    <p:tnLst>
-      <p:par>
-        <p:cTn id="1" dur="indefinite" restart="never" nodeType="tmRoot"/>
-      </p:par>
-    </p:tnLst>
-  </p:timing>
 </p:sld>
 </file>
 
@@ -5636,7 +5804,13 @@
       </p:grpSpPr>
       <p:sp>
         <p:nvSpPr>
-          <p:cNvPr id="4" name="Title 3"/>
+          <p:cNvPr id="2" name="Title 1">
+            <a:extLst>
+              <a:ext uri="{FF2B5EF4-FFF2-40B4-BE49-F238E27FC236}">
+                <a16:creationId xmlns:a16="http://schemas.microsoft.com/office/drawing/2014/main" id="{3D8280B8-1074-4F1E-80B1-7715F2C042C3}"/>
+              </a:ext>
+            </a:extLst>
+          </p:cNvPr>
           <p:cNvSpPr>
             <a:spLocks noGrp="1"/>
           </p:cNvSpPr>
@@ -5650,266 +5824,93 @@
           <a:lstStyle/>
           <a:p>
             <a:r>
-              <a:rPr lang="en-US" altLang="ko-KR" sz="3200" dirty="0" smtClean="0"/>
-              <a:t>Getting data and making sense of it</a:t>
-            </a:r>
-            <a:endParaRPr lang="ko-KR" altLang="en-US" sz="3200" dirty="0"/>
-          </a:p>
-        </p:txBody>
-      </p:sp>
-      <p:sp>
-        <p:nvSpPr>
-          <p:cNvPr id="5" name="TextBox 4"/>
-          <p:cNvSpPr txBox="1"/>
-          <p:nvPr/>
-        </p:nvSpPr>
+              <a:rPr lang="en-AU" dirty="0"/>
+              <a:t>User – </a:t>
+            </a:r>
+            <a:r>
+              <a:rPr lang="en-AU" dirty="0" err="1"/>
+              <a:t>Api</a:t>
+            </a:r>
+            <a:r>
+              <a:rPr lang="en-AU" dirty="0"/>
+              <a:t> – Data</a:t>
+            </a:r>
+          </a:p>
+        </p:txBody>
+      </p:sp>
+      <p:sp>
+        <p:nvSpPr>
+          <p:cNvPr id="3" name="Content Placeholder 2">
+            <a:extLst>
+              <a:ext uri="{FF2B5EF4-FFF2-40B4-BE49-F238E27FC236}">
+                <a16:creationId xmlns:a16="http://schemas.microsoft.com/office/drawing/2014/main" id="{A8609F02-D492-43A5-ABAD-A67C4C6C64C7}"/>
+              </a:ext>
+            </a:extLst>
+          </p:cNvPr>
+          <p:cNvSpPr>
+            <a:spLocks noGrp="1"/>
+          </p:cNvSpPr>
+          <p:nvPr>
+            <p:ph idx="1"/>
+          </p:nvPr>
+        </p:nvSpPr>
+        <p:spPr/>
+        <p:txBody>
+          <a:bodyPr/>
+          <a:lstStyle/>
+          <a:p>
+            <a:r>
+              <a:rPr lang="en-AU" dirty="0"/>
+              <a:t>We can communicate with APIs!</a:t>
+            </a:r>
+          </a:p>
+        </p:txBody>
+      </p:sp>
+      <p:pic>
+        <p:nvPicPr>
+          <p:cNvPr id="6" name="Content Placeholder 5">
+            <a:extLst>
+              <a:ext uri="{FF2B5EF4-FFF2-40B4-BE49-F238E27FC236}">
+                <a16:creationId xmlns:a16="http://schemas.microsoft.com/office/drawing/2014/main" id="{0FC96A01-7E6C-458D-A4E3-60D25B34409E}"/>
+              </a:ext>
+            </a:extLst>
+          </p:cNvPr>
+          <p:cNvPicPr>
+            <a:picLocks noGrp="1" noChangeAspect="1"/>
+          </p:cNvPicPr>
+          <p:nvPr>
+            <p:ph idx="10"/>
+          </p:nvPr>
+        </p:nvPicPr>
+        <p:blipFill>
+          <a:blip r:embed="rId2">
+            <a:extLst>
+              <a:ext uri="{28A0092B-C50C-407E-A947-70E740481C1C}">
+                <a14:useLocalDpi xmlns:a14="http://schemas.microsoft.com/office/drawing/2010/main" val="0"/>
+              </a:ext>
+            </a:extLst>
+          </a:blip>
+          <a:stretch>
+            <a:fillRect/>
+          </a:stretch>
+        </p:blipFill>
         <p:spPr>
           <a:xfrm>
-            <a:off x="467544" y="1484784"/>
-            <a:ext cx="7023076" cy="3416320"/>
+            <a:off x="1072912" y="2276475"/>
+            <a:ext cx="7020402" cy="3600450"/>
           </a:xfrm>
-          <a:prstGeom prst="rect">
-            <a:avLst/>
-          </a:prstGeom>
-          <a:noFill/>
         </p:spPr>
-        <p:txBody>
-          <a:bodyPr wrap="none" rtlCol="0">
-            <a:spAutoFit/>
-          </a:bodyPr>
-          <a:lstStyle/>
-          <a:p>
-            <a:r>
-              <a:rPr lang="en-US" dirty="0" smtClean="0"/>
-              <a:t>To get the data from the feed and set the </a:t>
-            </a:r>
-            <a:r>
-              <a:rPr lang="en-US" dirty="0" err="1" smtClean="0"/>
-              <a:t>lat</a:t>
-            </a:r>
-            <a:r>
-              <a:rPr lang="en-US" dirty="0" smtClean="0"/>
-              <a:t> </a:t>
-            </a:r>
-            <a:r>
-              <a:rPr lang="en-US" dirty="0" err="1" smtClean="0"/>
-              <a:t>lon</a:t>
-            </a:r>
-            <a:r>
-              <a:rPr lang="en-US" dirty="0" smtClean="0"/>
-              <a:t> variables:</a:t>
-            </a:r>
-          </a:p>
-          <a:p>
-            <a:endParaRPr lang="en-US" dirty="0"/>
-          </a:p>
-          <a:p>
-            <a:r>
-              <a:rPr lang="en-AU" dirty="0">
-                <a:latin typeface="Consolas" panose="020B0609020204030204" pitchFamily="49" charset="0"/>
-              </a:rPr>
-              <a:t>import </a:t>
-            </a:r>
-            <a:r>
-              <a:rPr lang="en-AU" dirty="0" err="1">
-                <a:latin typeface="Consolas" panose="020B0609020204030204" pitchFamily="49" charset="0"/>
-              </a:rPr>
-              <a:t>urllib.request</a:t>
-            </a:r>
-            <a:r>
-              <a:rPr lang="en-AU" dirty="0">
-                <a:latin typeface="Consolas" panose="020B0609020204030204" pitchFamily="49" charset="0"/>
-              </a:rPr>
-              <a:t>, </a:t>
-            </a:r>
-            <a:r>
-              <a:rPr lang="en-AU" dirty="0" err="1" smtClean="0">
-                <a:latin typeface="Consolas" panose="020B0609020204030204" pitchFamily="49" charset="0"/>
-              </a:rPr>
-              <a:t>json</a:t>
-            </a:r>
-            <a:endParaRPr lang="en-US" dirty="0" smtClean="0"/>
-          </a:p>
-          <a:p>
-            <a:r>
-              <a:rPr lang="en-AU" dirty="0" err="1" smtClean="0">
-                <a:latin typeface="Consolas" panose="020B0609020204030204" pitchFamily="49" charset="0"/>
-              </a:rPr>
-              <a:t>issUrl</a:t>
-            </a:r>
-            <a:r>
-              <a:rPr lang="en-AU" dirty="0" smtClean="0">
-                <a:latin typeface="Consolas" panose="020B0609020204030204" pitchFamily="49" charset="0"/>
-              </a:rPr>
-              <a:t> </a:t>
-            </a:r>
-            <a:r>
-              <a:rPr lang="en-AU" dirty="0">
-                <a:latin typeface="Consolas" panose="020B0609020204030204" pitchFamily="49" charset="0"/>
-              </a:rPr>
-              <a:t>= 'http://</a:t>
-            </a:r>
-            <a:r>
-              <a:rPr lang="en-AU" dirty="0" smtClean="0">
-                <a:latin typeface="Consolas" panose="020B0609020204030204" pitchFamily="49" charset="0"/>
-              </a:rPr>
-              <a:t>api.open-notify.org/</a:t>
-            </a:r>
-            <a:r>
-              <a:rPr lang="en-AU" dirty="0" err="1" smtClean="0">
-                <a:latin typeface="Consolas" panose="020B0609020204030204" pitchFamily="49" charset="0"/>
-              </a:rPr>
-              <a:t>iss-now.json</a:t>
-            </a:r>
-            <a:r>
-              <a:rPr lang="en-AU" dirty="0" smtClean="0">
-                <a:latin typeface="Consolas" panose="020B0609020204030204" pitchFamily="49" charset="0"/>
-              </a:rPr>
-              <a:t>‘</a:t>
-            </a:r>
-          </a:p>
-          <a:p>
-            <a:r>
-              <a:rPr lang="en-AU" dirty="0">
-                <a:latin typeface="Consolas" panose="020B0609020204030204" pitchFamily="49" charset="0"/>
-              </a:rPr>
-              <a:t>response = </a:t>
-            </a:r>
-            <a:r>
-              <a:rPr lang="en-AU" dirty="0" err="1">
-                <a:latin typeface="Consolas" panose="020B0609020204030204" pitchFamily="49" charset="0"/>
-              </a:rPr>
-              <a:t>urllib.request.urlopen</a:t>
-            </a:r>
-            <a:r>
-              <a:rPr lang="en-AU" dirty="0">
-                <a:latin typeface="Consolas" panose="020B0609020204030204" pitchFamily="49" charset="0"/>
-              </a:rPr>
-              <a:t>(</a:t>
-            </a:r>
-            <a:r>
-              <a:rPr lang="en-AU" dirty="0" err="1">
-                <a:latin typeface="Consolas" panose="020B0609020204030204" pitchFamily="49" charset="0"/>
-              </a:rPr>
-              <a:t>issUrl</a:t>
-            </a:r>
-            <a:r>
-              <a:rPr lang="en-AU" dirty="0">
-                <a:latin typeface="Consolas" panose="020B0609020204030204" pitchFamily="49" charset="0"/>
-              </a:rPr>
-              <a:t>)</a:t>
-            </a:r>
-          </a:p>
-          <a:p>
-            <a:r>
-              <a:rPr lang="en-AU" dirty="0">
-                <a:latin typeface="Consolas" panose="020B0609020204030204" pitchFamily="49" charset="0"/>
-              </a:rPr>
-              <a:t>result = </a:t>
-            </a:r>
-            <a:r>
-              <a:rPr lang="en-AU" dirty="0" err="1">
-                <a:latin typeface="Consolas" panose="020B0609020204030204" pitchFamily="49" charset="0"/>
-              </a:rPr>
-              <a:t>json.loads</a:t>
-            </a:r>
-            <a:r>
-              <a:rPr lang="en-AU" dirty="0">
-                <a:latin typeface="Consolas" panose="020B0609020204030204" pitchFamily="49" charset="0"/>
-              </a:rPr>
-              <a:t>(</a:t>
-            </a:r>
-            <a:r>
-              <a:rPr lang="en-AU" dirty="0" err="1">
-                <a:latin typeface="Consolas" panose="020B0609020204030204" pitchFamily="49" charset="0"/>
-              </a:rPr>
-              <a:t>response.read</a:t>
-            </a:r>
-            <a:r>
-              <a:rPr lang="en-AU" dirty="0">
-                <a:latin typeface="Consolas" panose="020B0609020204030204" pitchFamily="49" charset="0"/>
-              </a:rPr>
-              <a:t>())</a:t>
-            </a:r>
-          </a:p>
-          <a:p>
-            <a:endParaRPr lang="en-US" dirty="0" smtClean="0">
-              <a:latin typeface="Consolas" panose="020B0609020204030204" pitchFamily="49" charset="0"/>
-            </a:endParaRPr>
-          </a:p>
-          <a:p>
-            <a:r>
-              <a:rPr lang="en-US" dirty="0">
-                <a:latin typeface="Consolas" panose="020B0609020204030204" pitchFamily="49" charset="0"/>
-              </a:rPr>
-              <a:t>latitude = float(result['</a:t>
-            </a:r>
-            <a:r>
-              <a:rPr lang="en-US" dirty="0" err="1">
-                <a:latin typeface="Consolas" panose="020B0609020204030204" pitchFamily="49" charset="0"/>
-              </a:rPr>
-              <a:t>iss_position</a:t>
-            </a:r>
-            <a:r>
-              <a:rPr lang="en-US" dirty="0">
-                <a:latin typeface="Consolas" panose="020B0609020204030204" pitchFamily="49" charset="0"/>
-              </a:rPr>
-              <a:t>']['latitude'])</a:t>
-            </a:r>
-          </a:p>
-          <a:p>
-            <a:r>
-              <a:rPr lang="en-US" dirty="0">
-                <a:latin typeface="Consolas" panose="020B0609020204030204" pitchFamily="49" charset="0"/>
-              </a:rPr>
-              <a:t>longitude = float(result['</a:t>
-            </a:r>
-            <a:r>
-              <a:rPr lang="en-US" dirty="0" err="1">
-                <a:latin typeface="Consolas" panose="020B0609020204030204" pitchFamily="49" charset="0"/>
-              </a:rPr>
-              <a:t>iss_position</a:t>
-            </a:r>
-            <a:r>
-              <a:rPr lang="en-US" dirty="0">
-                <a:latin typeface="Consolas" panose="020B0609020204030204" pitchFamily="49" charset="0"/>
-              </a:rPr>
-              <a:t>']['longitude'])</a:t>
-            </a:r>
-          </a:p>
-          <a:p>
-            <a:endParaRPr lang="en-AU" dirty="0" smtClean="0">
-              <a:solidFill>
-                <a:srgbClr val="D4D4D4"/>
-              </a:solidFill>
-              <a:latin typeface="Consolas" panose="020B0609020204030204" pitchFamily="49" charset="0"/>
-            </a:endParaRPr>
-          </a:p>
-          <a:p>
-            <a:endParaRPr lang="en-US" dirty="0" smtClean="0"/>
-          </a:p>
-          <a:p>
-            <a:endParaRPr lang="en-AU" dirty="0"/>
-          </a:p>
-        </p:txBody>
-      </p:sp>
+      </p:pic>
     </p:spTree>
     <p:extLst>
       <p:ext uri="{BB962C8B-B14F-4D97-AF65-F5344CB8AC3E}">
-        <p14:creationId xmlns:p14="http://schemas.microsoft.com/office/powerpoint/2010/main" val="74654044"/>
+        <p14:creationId xmlns:p14="http://schemas.microsoft.com/office/powerpoint/2010/main" val="1809433584"/>
       </p:ext>
     </p:extLst>
   </p:cSld>
   <p:clrMapOvr>
     <a:masterClrMapping/>
   </p:clrMapOvr>
-  <p:timing>
-    <p:tnLst>
-      <p:par>
-        <p:cTn id="1" dur="indefinite" restart="never" nodeType="tmRoot"/>
-      </p:par>
-    </p:tnLst>
-  </p:timing>
 </p:sld>
 </file>
 
@@ -5946,8 +5947,8 @@
           <a:lstStyle/>
           <a:p>
             <a:r>
-              <a:rPr lang="en-US" altLang="ko-KR" sz="3200" dirty="0" smtClean="0"/>
-              <a:t>Creating a canvas space</a:t>
+              <a:rPr lang="en-US" altLang="ko-KR" sz="3200" dirty="0"/>
+              <a:t>Getting data and making sense of it</a:t>
             </a:r>
             <a:endParaRPr lang="ko-KR" altLang="en-US" sz="3200" dirty="0"/>
           </a:p>
@@ -5962,7 +5963,7 @@
         <p:spPr>
           <a:xfrm>
             <a:off x="467544" y="1484784"/>
-            <a:ext cx="4917180" cy="3970318"/>
+            <a:ext cx="7023076" cy="3416320"/>
           </a:xfrm>
           <a:prstGeom prst="rect">
             <a:avLst/>
@@ -5976,14 +5977,24 @@
           <a:lstStyle/>
           <a:p>
             <a:r>
-              <a:rPr lang="en-US" dirty="0" smtClean="0"/>
-              <a:t>Download the files from the repository and </a:t>
-            </a:r>
-          </a:p>
-          <a:p>
-            <a:r>
-              <a:rPr lang="en-US" dirty="0" smtClean="0"/>
-              <a:t>put them in the same folder with your code</a:t>
+              <a:rPr lang="en-US" dirty="0"/>
+              <a:t>To get the data from the feed and set the </a:t>
+            </a:r>
+            <a:r>
+              <a:rPr lang="en-US" dirty="0" err="1"/>
+              <a:t>lat</a:t>
+            </a:r>
+            <a:r>
+              <a:rPr lang="en-US" dirty="0"/>
+              <a:t> </a:t>
+            </a:r>
+            <a:r>
+              <a:rPr lang="en-US" dirty="0" err="1"/>
+              <a:t>lon</a:t>
+            </a:r>
+            <a:r>
+              <a:rPr lang="en-US" dirty="0"/>
+              <a:t> variables:</a:t>
             </a:r>
           </a:p>
           <a:p>
@@ -5991,76 +6002,168 @@
           </a:p>
           <a:p>
             <a:r>
-              <a:rPr lang="en-US" dirty="0"/>
-              <a:t>import turtle</a:t>
-            </a:r>
-          </a:p>
-          <a:p>
-            <a:r>
-              <a:rPr lang="en-US" dirty="0"/>
-              <a:t/>
-            </a:r>
-            <a:br>
-              <a:rPr lang="en-US" dirty="0"/>
-            </a:br>
-            <a:r>
-              <a:rPr lang="en-US" dirty="0"/>
-              <a:t># setting up the stage</a:t>
-            </a:r>
-          </a:p>
-          <a:p>
-            <a:r>
-              <a:rPr lang="en-US" dirty="0"/>
-              <a:t>screen = </a:t>
-            </a:r>
-            <a:r>
-              <a:rPr lang="en-US" dirty="0" err="1"/>
-              <a:t>turtle.Screen</a:t>
-            </a:r>
-            <a:r>
-              <a:rPr lang="en-US" dirty="0"/>
-              <a:t>()</a:t>
-            </a:r>
-          </a:p>
-          <a:p>
-            <a:r>
-              <a:rPr lang="en-US" dirty="0" err="1"/>
-              <a:t>screen.setup</a:t>
-            </a:r>
-            <a:r>
-              <a:rPr lang="en-US" dirty="0"/>
-              <a:t>(720,360)</a:t>
-            </a:r>
-          </a:p>
-          <a:p>
-            <a:r>
-              <a:rPr lang="en-US" dirty="0" err="1"/>
-              <a:t>screen.setworldcoordinates</a:t>
-            </a:r>
-            <a:r>
-              <a:rPr lang="en-US" dirty="0"/>
-              <a:t>(-180,-90, 180, 90)</a:t>
-            </a:r>
-          </a:p>
-          <a:p>
-            <a:r>
-              <a:rPr lang="en-US" dirty="0"/>
-              <a:t/>
-            </a:r>
-            <a:br>
-              <a:rPr lang="en-US" dirty="0"/>
-            </a:br>
-            <a:r>
-              <a:rPr lang="en-US" dirty="0" err="1"/>
-              <a:t>screen.bgpic</a:t>
-            </a:r>
-            <a:r>
-              <a:rPr lang="en-US" dirty="0"/>
-              <a:t>('map.gif')</a:t>
-            </a:r>
-          </a:p>
-          <a:p>
-            <a:endParaRPr lang="en-AU" dirty="0" smtClean="0">
+              <a:rPr lang="en-AU" dirty="0">
+                <a:latin typeface="Consolas" panose="020B0609020204030204" pitchFamily="49" charset="0"/>
+              </a:rPr>
+              <a:t>import </a:t>
+            </a:r>
+            <a:r>
+              <a:rPr lang="en-AU" dirty="0" err="1">
+                <a:latin typeface="Consolas" panose="020B0609020204030204" pitchFamily="49" charset="0"/>
+              </a:rPr>
+              <a:t>urllib.request</a:t>
+            </a:r>
+            <a:r>
+              <a:rPr lang="en-AU" dirty="0">
+                <a:latin typeface="Consolas" panose="020B0609020204030204" pitchFamily="49" charset="0"/>
+              </a:rPr>
+              <a:t>, </a:t>
+            </a:r>
+            <a:r>
+              <a:rPr lang="en-AU" dirty="0" err="1">
+                <a:latin typeface="Consolas" panose="020B0609020204030204" pitchFamily="49" charset="0"/>
+              </a:rPr>
+              <a:t>json</a:t>
+            </a:r>
+            <a:endParaRPr lang="en-US" dirty="0"/>
+          </a:p>
+          <a:p>
+            <a:r>
+              <a:rPr lang="en-AU" dirty="0" err="1">
+                <a:latin typeface="Consolas" panose="020B0609020204030204" pitchFamily="49" charset="0"/>
+              </a:rPr>
+              <a:t>issUrl</a:t>
+            </a:r>
+            <a:r>
+              <a:rPr lang="en-AU" dirty="0">
+                <a:latin typeface="Consolas" panose="020B0609020204030204" pitchFamily="49" charset="0"/>
+              </a:rPr>
+              <a:t> = 'http://api.open-notify.org/</a:t>
+            </a:r>
+            <a:r>
+              <a:rPr lang="en-AU" dirty="0" err="1">
+                <a:latin typeface="Consolas" panose="020B0609020204030204" pitchFamily="49" charset="0"/>
+              </a:rPr>
+              <a:t>iss-now.json</a:t>
+            </a:r>
+            <a:r>
+              <a:rPr lang="en-AU" dirty="0">
+                <a:latin typeface="Consolas" panose="020B0609020204030204" pitchFamily="49" charset="0"/>
+              </a:rPr>
+              <a:t>‘</a:t>
+            </a:r>
+          </a:p>
+          <a:p>
+            <a:r>
+              <a:rPr lang="en-AU" dirty="0">
+                <a:latin typeface="Consolas" panose="020B0609020204030204" pitchFamily="49" charset="0"/>
+              </a:rPr>
+              <a:t>response = </a:t>
+            </a:r>
+            <a:r>
+              <a:rPr lang="en-AU" dirty="0" err="1">
+                <a:latin typeface="Consolas" panose="020B0609020204030204" pitchFamily="49" charset="0"/>
+              </a:rPr>
+              <a:t>urllib.request.urlopen</a:t>
+            </a:r>
+            <a:r>
+              <a:rPr lang="en-AU" dirty="0">
+                <a:latin typeface="Consolas" panose="020B0609020204030204" pitchFamily="49" charset="0"/>
+              </a:rPr>
+              <a:t>(</a:t>
+            </a:r>
+            <a:r>
+              <a:rPr lang="en-AU" dirty="0" err="1">
+                <a:latin typeface="Consolas" panose="020B0609020204030204" pitchFamily="49" charset="0"/>
+              </a:rPr>
+              <a:t>issUrl</a:t>
+            </a:r>
+            <a:r>
+              <a:rPr lang="en-AU" dirty="0">
+                <a:latin typeface="Consolas" panose="020B0609020204030204" pitchFamily="49" charset="0"/>
+              </a:rPr>
+              <a:t>)</a:t>
+            </a:r>
+          </a:p>
+          <a:p>
+            <a:r>
+              <a:rPr lang="en-AU" dirty="0">
+                <a:latin typeface="Consolas" panose="020B0609020204030204" pitchFamily="49" charset="0"/>
+              </a:rPr>
+              <a:t>result = </a:t>
+            </a:r>
+            <a:r>
+              <a:rPr lang="en-AU" dirty="0" err="1">
+                <a:latin typeface="Consolas" panose="020B0609020204030204" pitchFamily="49" charset="0"/>
+              </a:rPr>
+              <a:t>json.loads</a:t>
+            </a:r>
+            <a:r>
+              <a:rPr lang="en-AU" dirty="0">
+                <a:latin typeface="Consolas" panose="020B0609020204030204" pitchFamily="49" charset="0"/>
+              </a:rPr>
+              <a:t>(</a:t>
+            </a:r>
+            <a:r>
+              <a:rPr lang="en-AU" dirty="0" err="1">
+                <a:latin typeface="Consolas" panose="020B0609020204030204" pitchFamily="49" charset="0"/>
+              </a:rPr>
+              <a:t>response.read</a:t>
+            </a:r>
+            <a:r>
+              <a:rPr lang="en-AU" dirty="0">
+                <a:latin typeface="Consolas" panose="020B0609020204030204" pitchFamily="49" charset="0"/>
+              </a:rPr>
+              <a:t>())</a:t>
+            </a:r>
+          </a:p>
+          <a:p>
+            <a:endParaRPr lang="en-US" dirty="0">
+              <a:latin typeface="Consolas" panose="020B0609020204030204" pitchFamily="49" charset="0"/>
+            </a:endParaRPr>
+          </a:p>
+          <a:p>
+            <a:r>
+              <a:rPr lang="en-US" dirty="0">
+                <a:latin typeface="Consolas" panose="020B0609020204030204" pitchFamily="49" charset="0"/>
+              </a:rPr>
+              <a:t>latitude = float(result['</a:t>
+            </a:r>
+            <a:r>
+              <a:rPr lang="en-US" dirty="0" err="1">
+                <a:latin typeface="Consolas" panose="020B0609020204030204" pitchFamily="49" charset="0"/>
+              </a:rPr>
+              <a:t>iss_position</a:t>
+            </a:r>
+            <a:r>
+              <a:rPr lang="en-US" dirty="0">
+                <a:latin typeface="Consolas" panose="020B0609020204030204" pitchFamily="49" charset="0"/>
+              </a:rPr>
+              <a:t>']['latitude'])</a:t>
+            </a:r>
+          </a:p>
+          <a:p>
+            <a:r>
+              <a:rPr lang="en-US" dirty="0">
+                <a:latin typeface="Consolas" panose="020B0609020204030204" pitchFamily="49" charset="0"/>
+              </a:rPr>
+              <a:t>longitude = float(result['</a:t>
+            </a:r>
+            <a:r>
+              <a:rPr lang="en-US" dirty="0" err="1">
+                <a:latin typeface="Consolas" panose="020B0609020204030204" pitchFamily="49" charset="0"/>
+              </a:rPr>
+              <a:t>iss_position</a:t>
+            </a:r>
+            <a:r>
+              <a:rPr lang="en-US" dirty="0">
+                <a:latin typeface="Consolas" panose="020B0609020204030204" pitchFamily="49" charset="0"/>
+              </a:rPr>
+              <a:t>']['longitude'])</a:t>
+            </a:r>
+          </a:p>
+          <a:p>
+            <a:endParaRPr lang="en-AU" dirty="0">
               <a:solidFill>
                 <a:srgbClr val="D4D4D4"/>
               </a:solidFill>
@@ -6068,7 +6171,7 @@
             </a:endParaRPr>
           </a:p>
           <a:p>
-            <a:endParaRPr lang="en-US" dirty="0" smtClean="0"/>
+            <a:endParaRPr lang="en-US" dirty="0"/>
           </a:p>
           <a:p>
             <a:endParaRPr lang="en-AU" dirty="0"/>
@@ -6078,20 +6181,13 @@
     </p:spTree>
     <p:extLst>
       <p:ext uri="{BB962C8B-B14F-4D97-AF65-F5344CB8AC3E}">
-        <p14:creationId xmlns:p14="http://schemas.microsoft.com/office/powerpoint/2010/main" val="602953880"/>
+        <p14:creationId xmlns:p14="http://schemas.microsoft.com/office/powerpoint/2010/main" val="74654044"/>
       </p:ext>
     </p:extLst>
   </p:cSld>
   <p:clrMapOvr>
     <a:masterClrMapping/>
   </p:clrMapOvr>
-  <p:timing>
-    <p:tnLst>
-      <p:par>
-        <p:cTn id="1" dur="indefinite" restart="never" nodeType="tmRoot"/>
-      </p:par>
-    </p:tnLst>
-  </p:timing>
 </p:sld>
 </file>
 
@@ -6128,8 +6224,8 @@
           <a:lstStyle/>
           <a:p>
             <a:r>
-              <a:rPr lang="en-US" altLang="ko-KR" sz="3200" dirty="0" smtClean="0"/>
-              <a:t>Drawing the ISS on the map</a:t>
+              <a:rPr lang="en-US" altLang="ko-KR" sz="3200" dirty="0"/>
+              <a:t>Creating a canvas space</a:t>
             </a:r>
             <a:endParaRPr lang="ko-KR" altLang="en-US" sz="3200" dirty="0"/>
           </a:p>
@@ -6144,7 +6240,7 @@
         <p:spPr>
           <a:xfrm>
             <a:off x="467544" y="1484784"/>
-            <a:ext cx="5187189" cy="2585323"/>
+            <a:ext cx="4917180" cy="3970318"/>
           </a:xfrm>
           <a:prstGeom prst="rect">
             <a:avLst/>
@@ -6158,135 +6254,107 @@
           <a:lstStyle/>
           <a:p>
             <a:r>
-              <a:rPr lang="en-AU" dirty="0" smtClean="0"/>
-              <a:t># </a:t>
-            </a:r>
-            <a:r>
-              <a:rPr lang="en-AU" dirty="0"/>
-              <a:t>setting up </a:t>
-            </a:r>
-            <a:r>
-              <a:rPr lang="en-AU" dirty="0" err="1"/>
-              <a:t>iss</a:t>
-            </a:r>
+              <a:rPr lang="en-US" dirty="0"/>
+              <a:t>Download the files from the repository and </a:t>
+            </a:r>
+          </a:p>
+          <a:p>
+            <a:r>
+              <a:rPr lang="en-US" dirty="0"/>
+              <a:t>put them in the same folder with your code</a:t>
+            </a:r>
+          </a:p>
+          <a:p>
+            <a:endParaRPr lang="en-US" dirty="0"/>
+          </a:p>
+          <a:p>
+            <a:r>
+              <a:rPr lang="en-US" dirty="0"/>
+              <a:t>import turtle</a:t>
+            </a:r>
+          </a:p>
+          <a:p>
+            <a:br>
+              <a:rPr lang="en-US" dirty="0"/>
+            </a:br>
+            <a:r>
+              <a:rPr lang="en-US" dirty="0"/>
+              <a:t># setting up the stage</a:t>
+            </a:r>
+          </a:p>
+          <a:p>
+            <a:r>
+              <a:rPr lang="en-US" dirty="0"/>
+              <a:t>screen = </a:t>
+            </a:r>
+            <a:r>
+              <a:rPr lang="en-US" dirty="0" err="1"/>
+              <a:t>turtle.Screen</a:t>
+            </a:r>
+            <a:r>
+              <a:rPr lang="en-US" dirty="0"/>
+              <a:t>()</a:t>
+            </a:r>
+          </a:p>
+          <a:p>
+            <a:r>
+              <a:rPr lang="en-US" dirty="0" err="1"/>
+              <a:t>screen.setup</a:t>
+            </a:r>
+            <a:r>
+              <a:rPr lang="en-US" dirty="0"/>
+              <a:t>(720,360)</a:t>
+            </a:r>
+          </a:p>
+          <a:p>
+            <a:r>
+              <a:rPr lang="en-US" dirty="0" err="1"/>
+              <a:t>screen.setworldcoordinates</a:t>
+            </a:r>
+            <a:r>
+              <a:rPr lang="en-US" dirty="0"/>
+              <a:t>(-180,-90, 180, 90)</a:t>
+            </a:r>
+          </a:p>
+          <a:p>
+            <a:br>
+              <a:rPr lang="en-US" dirty="0"/>
+            </a:br>
+            <a:r>
+              <a:rPr lang="en-US" dirty="0" err="1"/>
+              <a:t>screen.bgpic</a:t>
+            </a:r>
+            <a:r>
+              <a:rPr lang="en-US" dirty="0"/>
+              <a:t>('map.gif')</a:t>
+            </a:r>
+          </a:p>
+          <a:p>
+            <a:endParaRPr lang="en-AU" dirty="0">
+              <a:solidFill>
+                <a:srgbClr val="D4D4D4"/>
+              </a:solidFill>
+              <a:latin typeface="Consolas" panose="020B0609020204030204" pitchFamily="49" charset="0"/>
+            </a:endParaRPr>
+          </a:p>
+          <a:p>
+            <a:endParaRPr lang="en-US" dirty="0"/>
+          </a:p>
+          <a:p>
             <a:endParaRPr lang="en-AU" dirty="0"/>
-          </a:p>
-          <a:p>
-            <a:r>
-              <a:rPr lang="en-AU" dirty="0" err="1"/>
-              <a:t>screen.register_shape</a:t>
-            </a:r>
-            <a:r>
-              <a:rPr lang="en-AU" dirty="0"/>
-              <a:t>('iss.gif')</a:t>
-            </a:r>
-          </a:p>
-          <a:p>
-            <a:r>
-              <a:rPr lang="en-AU" dirty="0" err="1"/>
-              <a:t>iss</a:t>
-            </a:r>
-            <a:r>
-              <a:rPr lang="en-AU" dirty="0"/>
-              <a:t> = </a:t>
-            </a:r>
-            <a:r>
-              <a:rPr lang="en-AU" dirty="0" err="1"/>
-              <a:t>turtle.Turtle</a:t>
-            </a:r>
-            <a:r>
-              <a:rPr lang="en-AU" dirty="0"/>
-              <a:t>()</a:t>
-            </a:r>
-          </a:p>
-          <a:p>
-            <a:r>
-              <a:rPr lang="en-AU" dirty="0" err="1"/>
-              <a:t>iss.shape</a:t>
-            </a:r>
-            <a:r>
-              <a:rPr lang="en-AU" dirty="0"/>
-              <a:t>('iss.gif')</a:t>
-            </a:r>
-          </a:p>
-          <a:p>
-            <a:r>
-              <a:rPr lang="en-AU" dirty="0"/>
-              <a:t/>
-            </a:r>
-            <a:br>
-              <a:rPr lang="en-AU" dirty="0"/>
-            </a:br>
-            <a:r>
-              <a:rPr lang="en-AU" dirty="0"/>
-              <a:t># moving </a:t>
-            </a:r>
-            <a:r>
-              <a:rPr lang="en-AU" dirty="0" smtClean="0"/>
-              <a:t>the </a:t>
-            </a:r>
-            <a:r>
-              <a:rPr lang="en-AU" dirty="0" err="1" smtClean="0"/>
-              <a:t>iss</a:t>
-            </a:r>
-            <a:r>
-              <a:rPr lang="en-AU" dirty="0" smtClean="0"/>
-              <a:t> figure </a:t>
-            </a:r>
-            <a:r>
-              <a:rPr lang="en-AU" dirty="0"/>
-              <a:t>to where it is right now</a:t>
-            </a:r>
-          </a:p>
-          <a:p>
-            <a:r>
-              <a:rPr lang="en-AU" dirty="0" err="1"/>
-              <a:t>iss.penup</a:t>
-            </a:r>
-            <a:r>
-              <a:rPr lang="en-AU" dirty="0"/>
-              <a:t>()</a:t>
-            </a:r>
-          </a:p>
-          <a:p>
-            <a:r>
-              <a:rPr lang="en-AU" dirty="0" err="1"/>
-              <a:t>iss.goto</a:t>
-            </a:r>
-            <a:r>
-              <a:rPr lang="en-AU" dirty="0"/>
-              <a:t>(longitude, latitude)</a:t>
-            </a:r>
-          </a:p>
-          <a:p>
-            <a:r>
-              <a:rPr lang="en-AU" dirty="0" err="1"/>
-              <a:t>screen.exitonclick</a:t>
-            </a:r>
-            <a:r>
-              <a:rPr lang="en-AU" dirty="0"/>
-              <a:t>()</a:t>
-            </a:r>
           </a:p>
         </p:txBody>
       </p:sp>
     </p:spTree>
     <p:extLst>
       <p:ext uri="{BB962C8B-B14F-4D97-AF65-F5344CB8AC3E}">
-        <p14:creationId xmlns:p14="http://schemas.microsoft.com/office/powerpoint/2010/main" val="3848159192"/>
+        <p14:creationId xmlns:p14="http://schemas.microsoft.com/office/powerpoint/2010/main" val="602953880"/>
       </p:ext>
     </p:extLst>
   </p:cSld>
   <p:clrMapOvr>
     <a:masterClrMapping/>
   </p:clrMapOvr>
-  <p:timing>
-    <p:tnLst>
-      <p:par>
-        <p:cTn id="1" dur="indefinite" restart="never" nodeType="tmRoot"/>
-      </p:par>
-    </p:tnLst>
-  </p:timing>
 </p:sld>
 </file>
 
@@ -6323,104 +6391,128 @@
           <a:lstStyle/>
           <a:p>
             <a:r>
-              <a:rPr lang="en-AU" altLang="ko-KR" sz="3600" dirty="0"/>
-              <a:t>How to start</a:t>
-            </a:r>
-            <a:endParaRPr lang="ko-KR" altLang="en-US" sz="3600" dirty="0"/>
-          </a:p>
-        </p:txBody>
-      </p:sp>
-      <p:sp>
-        <p:nvSpPr>
-          <p:cNvPr id="12" name="Content Placeholder 11"/>
-          <p:cNvSpPr>
-            <a:spLocks noGrp="1"/>
-          </p:cNvSpPr>
-          <p:nvPr>
-            <p:ph idx="1"/>
-          </p:nvPr>
-        </p:nvSpPr>
-        <p:spPr/>
-        <p:txBody>
-          <a:bodyPr/>
-          <a:lstStyle/>
-          <a:p>
-            <a:pPr lvl="0"/>
-            <a:r>
-              <a:rPr lang="en-US" altLang="ko-KR" sz="3600" b="1" dirty="0"/>
-              <a:t>Information</a:t>
-            </a:r>
-            <a:endParaRPr lang="en-US" altLang="ko-KR" sz="3600" b="1" dirty="0">
-              <a:latin typeface="Arial" pitchFamily="34" charset="0"/>
-              <a:cs typeface="Arial" pitchFamily="34" charset="0"/>
-            </a:endParaRPr>
-          </a:p>
-        </p:txBody>
-      </p:sp>
-      <p:sp>
-        <p:nvSpPr>
-          <p:cNvPr id="11" name="Content Placeholder 12">
-            <a:extLst>
-              <a:ext uri="{FF2B5EF4-FFF2-40B4-BE49-F238E27FC236}">
-                <a16:creationId xmlns:a16="http://schemas.microsoft.com/office/drawing/2014/main" id="{35F7BFCC-2D2C-4503-8733-9FC417B39772}"/>
-              </a:ext>
-            </a:extLst>
-          </p:cNvPr>
-          <p:cNvSpPr>
-            <a:spLocks noGrp="1"/>
-          </p:cNvSpPr>
-          <p:nvPr>
-            <p:ph idx="10"/>
-          </p:nvPr>
+              <a:rPr lang="en-US" altLang="ko-KR" sz="3200" dirty="0"/>
+              <a:t>Drawing the ISS on the map</a:t>
+            </a:r>
+            <a:endParaRPr lang="ko-KR" altLang="en-US" sz="3200" dirty="0"/>
+          </a:p>
+        </p:txBody>
+      </p:sp>
+      <p:sp>
+        <p:nvSpPr>
+          <p:cNvPr id="5" name="TextBox 4"/>
+          <p:cNvSpPr txBox="1"/>
+          <p:nvPr/>
         </p:nvSpPr>
         <p:spPr>
           <a:xfrm>
-            <a:off x="1763688" y="1844824"/>
-            <a:ext cx="6563072" cy="1584176"/>
+            <a:off x="467544" y="1484784"/>
+            <a:ext cx="5187189" cy="2585323"/>
           </a:xfrm>
+          <a:prstGeom prst="rect">
+            <a:avLst/>
+          </a:prstGeom>
+          <a:noFill/>
         </p:spPr>
         <p:txBody>
-          <a:bodyPr/>
+          <a:bodyPr wrap="none" rtlCol="0">
+            <a:spAutoFit/>
+          </a:bodyPr>
           <a:lstStyle/>
           <a:p>
-            <a:pPr marL="285750" indent="-285750">
-              <a:buFont typeface="Arial" panose="020B0604020202020204" pitchFamily="34" charset="0"/>
-              <a:buChar char="•"/>
-            </a:pPr>
-            <a:r>
-              <a:rPr lang="en-AU" altLang="ko-KR" sz="3200" dirty="0">
-                <a:latin typeface="Arial" pitchFamily="34" charset="0"/>
-                <a:cs typeface="Arial" pitchFamily="34" charset="0"/>
-              </a:rPr>
-              <a:t>Readme: ……</a:t>
-            </a:r>
-          </a:p>
-          <a:p>
-            <a:pPr marL="285750" indent="-285750">
-              <a:buFont typeface="Arial" panose="020B0604020202020204" pitchFamily="34" charset="0"/>
-              <a:buChar char="•"/>
-            </a:pPr>
-            <a:r>
-              <a:rPr lang="en-AU" altLang="ko-KR" sz="3200" dirty="0">
-                <a:latin typeface="Arial" pitchFamily="34" charset="0"/>
-                <a:cs typeface="Arial" pitchFamily="34" charset="0"/>
-              </a:rPr>
-              <a:t>API: …………</a:t>
-            </a:r>
-          </a:p>
-          <a:p>
-            <a:endParaRPr lang="en-AU" altLang="ko-KR" sz="3200" dirty="0">
-              <a:latin typeface="Arial" pitchFamily="34" charset="0"/>
-              <a:cs typeface="Arial" pitchFamily="34" charset="0"/>
-            </a:endParaRPr>
-          </a:p>
-          <a:p>
-            <a:r>
-              <a:rPr lang="en-AU" altLang="ko-KR" sz="3200" dirty="0">
-                <a:latin typeface="Arial" pitchFamily="34" charset="0"/>
-                <a:cs typeface="Arial" pitchFamily="34" charset="0"/>
-              </a:rPr>
-              <a:t>Now let’s do it!</a:t>
+            <a:r>
+              <a:rPr lang="en-AU" dirty="0"/>
+              <a:t># setting up </a:t>
+            </a:r>
+            <a:r>
+              <a:rPr lang="en-AU" dirty="0" err="1"/>
+              <a:t>iss</a:t>
+            </a:r>
+            <a:endParaRPr lang="en-AU" dirty="0"/>
+          </a:p>
+          <a:p>
+            <a:r>
+              <a:rPr lang="en-AU" dirty="0" err="1"/>
+              <a:t>screen.register_shape</a:t>
+            </a:r>
+            <a:r>
+              <a:rPr lang="en-AU" dirty="0"/>
+              <a:t>('iss.gif')</a:t>
+            </a:r>
+          </a:p>
+          <a:p>
+            <a:r>
+              <a:rPr lang="en-AU" dirty="0" err="1"/>
+              <a:t>iss</a:t>
+            </a:r>
+            <a:r>
+              <a:rPr lang="en-AU" dirty="0"/>
+              <a:t> = </a:t>
+            </a:r>
+            <a:r>
+              <a:rPr lang="en-AU" dirty="0" err="1"/>
+              <a:t>turtle.Turtle</a:t>
+            </a:r>
+            <a:r>
+              <a:rPr lang="en-AU" dirty="0"/>
+              <a:t>()</a:t>
+            </a:r>
+          </a:p>
+          <a:p>
+            <a:r>
+              <a:rPr lang="en-AU" dirty="0" err="1"/>
+              <a:t>iss.shape</a:t>
+            </a:r>
+            <a:r>
+              <a:rPr lang="en-AU" dirty="0"/>
+              <a:t>('iss.gif')</a:t>
+            </a:r>
+          </a:p>
+          <a:p>
+            <a:br>
+              <a:rPr lang="en-AU" dirty="0"/>
+            </a:br>
+            <a:r>
+              <a:rPr lang="en-AU" dirty="0"/>
+              <a:t># moving the </a:t>
+            </a:r>
+            <a:r>
+              <a:rPr lang="en-AU" dirty="0" err="1"/>
+              <a:t>iss</a:t>
+            </a:r>
+            <a:r>
+              <a:rPr lang="en-AU" dirty="0"/>
+              <a:t> figure to where it is right now</a:t>
+            </a:r>
+          </a:p>
+          <a:p>
+            <a:r>
+              <a:rPr lang="en-AU" dirty="0" err="1"/>
+              <a:t>iss.penup</a:t>
+            </a:r>
+            <a:r>
+              <a:rPr lang="en-AU" dirty="0"/>
+              <a:t>()</a:t>
+            </a:r>
+          </a:p>
+          <a:p>
+            <a:r>
+              <a:rPr lang="en-AU" dirty="0" err="1"/>
+              <a:t>iss.goto</a:t>
+            </a:r>
+            <a:r>
+              <a:rPr lang="en-AU" dirty="0"/>
+              <a:t>(longitude, latitude)</a:t>
+            </a:r>
+          </a:p>
+          <a:p>
+            <a:r>
+              <a:rPr lang="en-AU" dirty="0" err="1"/>
+              <a:t>screen.exitonclick</a:t>
+            </a:r>
+            <a:r>
+              <a:rPr lang="en-AU" dirty="0"/>
+              <a:t>()</a:t>
             </a:r>
           </a:p>
         </p:txBody>
@@ -6428,20 +6520,13 @@
     </p:spTree>
     <p:extLst>
       <p:ext uri="{BB962C8B-B14F-4D97-AF65-F5344CB8AC3E}">
-        <p14:creationId xmlns:p14="http://schemas.microsoft.com/office/powerpoint/2010/main" val="3659674305"/>
+        <p14:creationId xmlns:p14="http://schemas.microsoft.com/office/powerpoint/2010/main" val="3848159192"/>
       </p:ext>
     </p:extLst>
   </p:cSld>
   <p:clrMapOvr>
     <a:masterClrMapping/>
   </p:clrMapOvr>
-  <p:timing>
-    <p:tnLst>
-      <p:par>
-        <p:cTn id="1" dur="indefinite" restart="never" nodeType="tmRoot"/>
-      </p:par>
-    </p:tnLst>
-  </p:timing>
 </p:sld>
 </file>
 

</xml_diff>